<commit_message>
Added place for EER diagram and Relational mapping (will add it when those are done)
</commit_message>
<xml_diff>
--- a/COS 216 Homework Assignment.pptx
+++ b/COS 216 Homework Assignment.pptx
@@ -5,18 +5,20 @@
     <p:sldMasterId id="2147483682" r:id="rId1"/>
   </p:sldMasterIdLst>
   <p:notesMasterIdLst>
-    <p:notesMasterId r:id="rId8"/>
+    <p:notesMasterId r:id="rId10"/>
   </p:notesMasterIdLst>
   <p:handoutMasterIdLst>
-    <p:handoutMasterId r:id="rId9"/>
+    <p:handoutMasterId r:id="rId11"/>
   </p:handoutMasterIdLst>
   <p:sldIdLst>
     <p:sldId id="261" r:id="rId2"/>
-    <p:sldId id="257" r:id="rId3"/>
-    <p:sldId id="271" r:id="rId4"/>
-    <p:sldId id="270" r:id="rId5"/>
-    <p:sldId id="272" r:id="rId6"/>
-    <p:sldId id="273" r:id="rId7"/>
+    <p:sldId id="274" r:id="rId3"/>
+    <p:sldId id="257" r:id="rId4"/>
+    <p:sldId id="275" r:id="rId5"/>
+    <p:sldId id="271" r:id="rId6"/>
+    <p:sldId id="270" r:id="rId7"/>
+    <p:sldId id="272" r:id="rId8"/>
+    <p:sldId id="273" r:id="rId9"/>
   </p:sldIdLst>
   <p:sldSz cx="12192000" cy="6858000"/>
   <p:notesSz cx="6858000" cy="9144000"/>
@@ -121,7 +123,9 @@
         <p14:section name="Default Section" id="{38F9D5AB-6865-40D2-A77A-EFB78DC7E2B2}">
           <p14:sldIdLst>
             <p14:sldId id="261"/>
+            <p14:sldId id="274"/>
             <p14:sldId id="257"/>
+            <p14:sldId id="275"/>
             <p14:sldId id="271"/>
             <p14:sldId id="270"/>
             <p14:sldId id="272"/>
@@ -233,7 +237,7 @@
           <a:p>
             <a:fld id="{59041DB8-B66F-4DC8-A96E-33677E0F90FF}" type="datetimeFigureOut">
               <a:rPr lang="en-US" smtClean="0"/>
-              <a:t>5/22/2025</a:t>
+              <a:t>5/25/2025</a:t>
             </a:fld>
             <a:endParaRPr lang="en-US"/>
           </a:p>
@@ -398,7 +402,7 @@
           <a:p>
             <a:fld id="{DEB49C4A-65AC-492D-9701-81B46C3AD0E4}" type="datetimeFigureOut">
               <a:rPr lang="en-US" smtClean="0"/>
-              <a:t>5/22/2025</a:t>
+              <a:t>5/25/2025</a:t>
             </a:fld>
             <a:endParaRPr lang="en-US"/>
           </a:p>
@@ -670,6 +674,114 @@
   <p:cSld>
     <p:spTree>
       <p:nvGrpSpPr>
+        <p:cNvPr id="1" name="">
+          <a:extLst>
+            <a:ext uri="{FF2B5EF4-FFF2-40B4-BE49-F238E27FC236}">
+              <a16:creationId xmlns:a16="http://schemas.microsoft.com/office/drawing/2014/main" id="{678B0EA8-860F-2855-1805-651245A62028}"/>
+            </a:ext>
+          </a:extLst>
+        </p:cNvPr>
+        <p:cNvGrpSpPr/>
+        <p:nvPr/>
+      </p:nvGrpSpPr>
+      <p:grpSpPr>
+        <a:xfrm>
+          <a:off x="0" y="0"/>
+          <a:ext cx="0" cy="0"/>
+          <a:chOff x="0" y="0"/>
+          <a:chExt cx="0" cy="0"/>
+        </a:xfrm>
+      </p:grpSpPr>
+      <p:sp>
+        <p:nvSpPr>
+          <p:cNvPr id="2" name="Slide Image Placeholder 1">
+            <a:extLst>
+              <a:ext uri="{FF2B5EF4-FFF2-40B4-BE49-F238E27FC236}">
+                <a16:creationId xmlns:a16="http://schemas.microsoft.com/office/drawing/2014/main" id="{8C9C8938-6537-7E97-926B-E9401D64C311}"/>
+              </a:ext>
+            </a:extLst>
+          </p:cNvPr>
+          <p:cNvSpPr>
+            <a:spLocks noGrp="1" noRot="1" noChangeAspect="1"/>
+          </p:cNvSpPr>
+          <p:nvPr>
+            <p:ph type="sldImg"/>
+          </p:nvPr>
+        </p:nvSpPr>
+        <p:spPr/>
+      </p:sp>
+      <p:sp>
+        <p:nvSpPr>
+          <p:cNvPr id="3" name="Notes Placeholder 2">
+            <a:extLst>
+              <a:ext uri="{FF2B5EF4-FFF2-40B4-BE49-F238E27FC236}">
+                <a16:creationId xmlns:a16="http://schemas.microsoft.com/office/drawing/2014/main" id="{AFB3968A-2BCB-94DF-1334-ABDEA65A2FC2}"/>
+              </a:ext>
+            </a:extLst>
+          </p:cNvPr>
+          <p:cNvSpPr>
+            <a:spLocks noGrp="1"/>
+          </p:cNvSpPr>
+          <p:nvPr>
+            <p:ph type="body" idx="1"/>
+          </p:nvPr>
+        </p:nvSpPr>
+        <p:spPr/>
+        <p:txBody>
+          <a:bodyPr/>
+          <a:lstStyle/>
+          <a:p>
+            <a:endParaRPr lang="en-US"/>
+          </a:p>
+        </p:txBody>
+      </p:sp>
+      <p:sp>
+        <p:nvSpPr>
+          <p:cNvPr id="4" name="Slide Number Placeholder 3">
+            <a:extLst>
+              <a:ext uri="{FF2B5EF4-FFF2-40B4-BE49-F238E27FC236}">
+                <a16:creationId xmlns:a16="http://schemas.microsoft.com/office/drawing/2014/main" id="{174C5018-22AA-2394-AF9E-BEF871853A05}"/>
+              </a:ext>
+            </a:extLst>
+          </p:cNvPr>
+          <p:cNvSpPr>
+            <a:spLocks noGrp="1"/>
+          </p:cNvSpPr>
+          <p:nvPr>
+            <p:ph type="sldNum" sz="quarter" idx="10"/>
+          </p:nvPr>
+        </p:nvSpPr>
+        <p:spPr/>
+        <p:txBody>
+          <a:bodyPr/>
+          <a:lstStyle/>
+          <a:p>
+            <a:fld id="{82869989-EB00-4EE7-BCB5-25BDC5BB29F8}" type="slidenum">
+              <a:rPr lang="en-US" smtClean="0"/>
+              <a:t>2</a:t>
+            </a:fld>
+            <a:endParaRPr lang="en-US"/>
+          </a:p>
+        </p:txBody>
+      </p:sp>
+    </p:spTree>
+    <p:extLst>
+      <p:ext uri="{BB962C8B-B14F-4D97-AF65-F5344CB8AC3E}">
+        <p14:creationId xmlns:p14="http://schemas.microsoft.com/office/powerpoint/2010/main" val="4235502510"/>
+      </p:ext>
+    </p:extLst>
+  </p:cSld>
+  <p:clrMapOvr>
+    <a:masterClrMapping/>
+  </p:clrMapOvr>
+</p:notes>
+</file>
+
+<file path=ppt/notesSlides/notesSlide2.xml><?xml version="1.0" encoding="utf-8"?>
+<p:notes xmlns:a="http://schemas.openxmlformats.org/drawingml/2006/main" xmlns:r="http://schemas.openxmlformats.org/officeDocument/2006/relationships" xmlns:p="http://schemas.openxmlformats.org/presentationml/2006/main">
+  <p:cSld>
+    <p:spTree>
+      <p:nvGrpSpPr>
         <p:cNvPr id="1" name=""/>
         <p:cNvGrpSpPr/>
         <p:nvPr/>
@@ -730,7 +842,7 @@
           <a:p>
             <a:fld id="{82869989-EB00-4EE7-BCB5-25BDC5BB29F8}" type="slidenum">
               <a:rPr lang="en-US" smtClean="0"/>
-              <a:t>2</a:t>
+              <a:t>3</a:t>
             </a:fld>
             <a:endParaRPr lang="en-US"/>
           </a:p>
@@ -749,7 +861,115 @@
 </p:notes>
 </file>
 
-<file path=ppt/notesSlides/notesSlide2.xml><?xml version="1.0" encoding="utf-8"?>
+<file path=ppt/notesSlides/notesSlide3.xml><?xml version="1.0" encoding="utf-8"?>
+<p:notes xmlns:a="http://schemas.openxmlformats.org/drawingml/2006/main" xmlns:r="http://schemas.openxmlformats.org/officeDocument/2006/relationships" xmlns:p="http://schemas.openxmlformats.org/presentationml/2006/main">
+  <p:cSld>
+    <p:spTree>
+      <p:nvGrpSpPr>
+        <p:cNvPr id="1" name="">
+          <a:extLst>
+            <a:ext uri="{FF2B5EF4-FFF2-40B4-BE49-F238E27FC236}">
+              <a16:creationId xmlns:a16="http://schemas.microsoft.com/office/drawing/2014/main" id="{58F9F570-AAEC-4555-FED6-AF2CF9BFF4EC}"/>
+            </a:ext>
+          </a:extLst>
+        </p:cNvPr>
+        <p:cNvGrpSpPr/>
+        <p:nvPr/>
+      </p:nvGrpSpPr>
+      <p:grpSpPr>
+        <a:xfrm>
+          <a:off x="0" y="0"/>
+          <a:ext cx="0" cy="0"/>
+          <a:chOff x="0" y="0"/>
+          <a:chExt cx="0" cy="0"/>
+        </a:xfrm>
+      </p:grpSpPr>
+      <p:sp>
+        <p:nvSpPr>
+          <p:cNvPr id="2" name="Slide Image Placeholder 1">
+            <a:extLst>
+              <a:ext uri="{FF2B5EF4-FFF2-40B4-BE49-F238E27FC236}">
+                <a16:creationId xmlns:a16="http://schemas.microsoft.com/office/drawing/2014/main" id="{F5BFA7BD-5B12-F2FC-F460-53267BFF7BA3}"/>
+              </a:ext>
+            </a:extLst>
+          </p:cNvPr>
+          <p:cNvSpPr>
+            <a:spLocks noGrp="1" noRot="1" noChangeAspect="1"/>
+          </p:cNvSpPr>
+          <p:nvPr>
+            <p:ph type="sldImg"/>
+          </p:nvPr>
+        </p:nvSpPr>
+        <p:spPr/>
+      </p:sp>
+      <p:sp>
+        <p:nvSpPr>
+          <p:cNvPr id="3" name="Notes Placeholder 2">
+            <a:extLst>
+              <a:ext uri="{FF2B5EF4-FFF2-40B4-BE49-F238E27FC236}">
+                <a16:creationId xmlns:a16="http://schemas.microsoft.com/office/drawing/2014/main" id="{17A59BBA-C874-6AE4-81C8-9B9F75653DCC}"/>
+              </a:ext>
+            </a:extLst>
+          </p:cNvPr>
+          <p:cNvSpPr>
+            <a:spLocks noGrp="1"/>
+          </p:cNvSpPr>
+          <p:nvPr>
+            <p:ph type="body" idx="1"/>
+          </p:nvPr>
+        </p:nvSpPr>
+        <p:spPr/>
+        <p:txBody>
+          <a:bodyPr/>
+          <a:lstStyle/>
+          <a:p>
+            <a:endParaRPr lang="en-US"/>
+          </a:p>
+        </p:txBody>
+      </p:sp>
+      <p:sp>
+        <p:nvSpPr>
+          <p:cNvPr id="4" name="Slide Number Placeholder 3">
+            <a:extLst>
+              <a:ext uri="{FF2B5EF4-FFF2-40B4-BE49-F238E27FC236}">
+                <a16:creationId xmlns:a16="http://schemas.microsoft.com/office/drawing/2014/main" id="{0A894ABD-AF9C-D510-A07A-6A50C4E2270A}"/>
+              </a:ext>
+            </a:extLst>
+          </p:cNvPr>
+          <p:cNvSpPr>
+            <a:spLocks noGrp="1"/>
+          </p:cNvSpPr>
+          <p:nvPr>
+            <p:ph type="sldNum" sz="quarter" idx="10"/>
+          </p:nvPr>
+        </p:nvSpPr>
+        <p:spPr/>
+        <p:txBody>
+          <a:bodyPr/>
+          <a:lstStyle/>
+          <a:p>
+            <a:fld id="{82869989-EB00-4EE7-BCB5-25BDC5BB29F8}" type="slidenum">
+              <a:rPr lang="en-US" smtClean="0"/>
+              <a:t>4</a:t>
+            </a:fld>
+            <a:endParaRPr lang="en-US"/>
+          </a:p>
+        </p:txBody>
+      </p:sp>
+    </p:spTree>
+    <p:extLst>
+      <p:ext uri="{BB962C8B-B14F-4D97-AF65-F5344CB8AC3E}">
+        <p14:creationId xmlns:p14="http://schemas.microsoft.com/office/powerpoint/2010/main" val="1143787023"/>
+      </p:ext>
+    </p:extLst>
+  </p:cSld>
+  <p:clrMapOvr>
+    <a:masterClrMapping/>
+  </p:clrMapOvr>
+</p:notes>
+</file>
+
+<file path=ppt/notesSlides/notesSlide4.xml><?xml version="1.0" encoding="utf-8"?>
 <p:notes xmlns:a="http://schemas.openxmlformats.org/drawingml/2006/main" xmlns:r="http://schemas.openxmlformats.org/officeDocument/2006/relationships" xmlns:p="http://schemas.openxmlformats.org/presentationml/2006/main">
   <p:cSld>
     <p:spTree>
@@ -838,7 +1058,7 @@
           <a:p>
             <a:fld id="{82869989-EB00-4EE7-BCB5-25BDC5BB29F8}" type="slidenum">
               <a:rPr lang="en-US" smtClean="0"/>
-              <a:t>3</a:t>
+              <a:t>5</a:t>
             </a:fld>
             <a:endParaRPr lang="en-US"/>
           </a:p>
@@ -857,7 +1077,7 @@
 </p:notes>
 </file>
 
-<file path=ppt/notesSlides/notesSlide3.xml><?xml version="1.0" encoding="utf-8"?>
+<file path=ppt/notesSlides/notesSlide5.xml><?xml version="1.0" encoding="utf-8"?>
 <p:notes xmlns:a="http://schemas.openxmlformats.org/drawingml/2006/main" xmlns:r="http://schemas.openxmlformats.org/officeDocument/2006/relationships" xmlns:p="http://schemas.openxmlformats.org/presentationml/2006/main">
   <p:cSld>
     <p:spTree>
@@ -946,7 +1166,7 @@
           <a:p>
             <a:fld id="{82869989-EB00-4EE7-BCB5-25BDC5BB29F8}" type="slidenum">
               <a:rPr lang="en-US" smtClean="0"/>
-              <a:t>4</a:t>
+              <a:t>6</a:t>
             </a:fld>
             <a:endParaRPr lang="en-US"/>
           </a:p>
@@ -965,7 +1185,7 @@
 </p:notes>
 </file>
 
-<file path=ppt/notesSlides/notesSlide4.xml><?xml version="1.0" encoding="utf-8"?>
+<file path=ppt/notesSlides/notesSlide6.xml><?xml version="1.0" encoding="utf-8"?>
 <p:notes xmlns:a="http://schemas.openxmlformats.org/drawingml/2006/main" xmlns:r="http://schemas.openxmlformats.org/officeDocument/2006/relationships" xmlns:p="http://schemas.openxmlformats.org/presentationml/2006/main">
   <p:cSld>
     <p:spTree>
@@ -1054,7 +1274,7 @@
           <a:p>
             <a:fld id="{82869989-EB00-4EE7-BCB5-25BDC5BB29F8}" type="slidenum">
               <a:rPr lang="en-US" smtClean="0"/>
-              <a:t>5</a:t>
+              <a:t>7</a:t>
             </a:fld>
             <a:endParaRPr lang="en-US"/>
           </a:p>
@@ -1073,7 +1293,7 @@
 </p:notes>
 </file>
 
-<file path=ppt/notesSlides/notesSlide5.xml><?xml version="1.0" encoding="utf-8"?>
+<file path=ppt/notesSlides/notesSlide7.xml><?xml version="1.0" encoding="utf-8"?>
 <p:notes xmlns:a="http://schemas.openxmlformats.org/drawingml/2006/main" xmlns:r="http://schemas.openxmlformats.org/officeDocument/2006/relationships" xmlns:p="http://schemas.openxmlformats.org/presentationml/2006/main">
   <p:cSld>
     <p:spTree>
@@ -1162,7 +1382,7 @@
           <a:p>
             <a:fld id="{82869989-EB00-4EE7-BCB5-25BDC5BB29F8}" type="slidenum">
               <a:rPr lang="en-US" smtClean="0"/>
-              <a:t>6</a:t>
+              <a:t>8</a:t>
             </a:fld>
             <a:endParaRPr lang="en-US"/>
           </a:p>
@@ -1312,7 +1532,7 @@
           <a:p>
             <a:fld id="{B10618EB-EF56-4375-8DB5-E9051D673290}" type="datetimeFigureOut">
               <a:rPr lang="en-ZA" smtClean="0"/>
-              <a:t>2025/05/22</a:t>
+              <a:t>2025/05/25</a:t>
             </a:fld>
             <a:endParaRPr lang="en-ZA"/>
           </a:p>
@@ -3660,7 +3880,7 @@
           <a:p>
             <a:fld id="{384A29A4-78C8-47AB-BA06-22CB45938951}" type="datetime1">
               <a:rPr lang="en-US" smtClean="0"/>
-              <a:t>5/22/2025</a:t>
+              <a:t>5/25/2025</a:t>
             </a:fld>
             <a:endParaRPr lang="en-US"/>
           </a:p>
@@ -3856,7 +4076,7 @@
           <a:p>
             <a:fld id="{E1ED4ACF-2D82-46F2-A8E9-23963AA34E86}" type="datetime1">
               <a:rPr lang="en-US" smtClean="0"/>
-              <a:t>5/22/2025</a:t>
+              <a:t>5/25/2025</a:t>
             </a:fld>
             <a:endParaRPr lang="en-US"/>
           </a:p>
@@ -4042,7 +4262,7 @@
           <a:p>
             <a:fld id="{AE374B5B-21A0-4192-BF4C-38187F1A68D8}" type="datetime1">
               <a:rPr lang="en-US" smtClean="0"/>
-              <a:t>5/22/2025</a:t>
+              <a:t>5/25/2025</a:t>
             </a:fld>
             <a:endParaRPr lang="en-US"/>
           </a:p>
@@ -4304,7 +4524,7 @@
           <a:p>
             <a:fld id="{B10618EB-EF56-4375-8DB5-E9051D673290}" type="datetimeFigureOut">
               <a:rPr lang="en-ZA" smtClean="0"/>
-              <a:t>2025/05/22</a:t>
+              <a:t>2025/05/25</a:t>
             </a:fld>
             <a:endParaRPr lang="en-ZA"/>
           </a:p>
@@ -6718,7 +6938,7 @@
           <a:p>
             <a:fld id="{33B5CF7C-B333-48E1-A4A6-83A3C8B73AC0}" type="datetime1">
               <a:rPr lang="en-US" smtClean="0"/>
-              <a:t>5/22/2025</a:t>
+              <a:t>5/25/2025</a:t>
             </a:fld>
             <a:endParaRPr lang="en-US"/>
           </a:p>
@@ -7101,7 +7321,7 @@
           <a:p>
             <a:fld id="{AE320762-5CBF-4210-AB54-376B091119F8}" type="datetime1">
               <a:rPr lang="en-US" smtClean="0"/>
-              <a:t>5/22/2025</a:t>
+              <a:t>5/25/2025</a:t>
             </a:fld>
             <a:endParaRPr lang="en-US"/>
           </a:p>
@@ -7235,7 +7455,7 @@
           <a:p>
             <a:fld id="{7F0DB371-BF5F-4058-A212-1A908E4D2674}" type="datetime1">
               <a:rPr lang="en-US" smtClean="0"/>
-              <a:t>5/22/2025</a:t>
+              <a:t>5/25/2025</a:t>
             </a:fld>
             <a:endParaRPr lang="en-US"/>
           </a:p>
@@ -7346,7 +7566,7 @@
           <a:p>
             <a:fld id="{60A4083B-90AA-48CF-BAD5-00AA24D7F288}" type="datetime1">
               <a:rPr lang="en-US" smtClean="0"/>
-              <a:t>5/22/2025</a:t>
+              <a:t>5/25/2025</a:t>
             </a:fld>
             <a:endParaRPr lang="en-US"/>
           </a:p>
@@ -9770,7 +9990,7 @@
             <a:fld id="{F5BAF629-ECA2-4CF3-B790-9D9BDED98269}" type="datetime1">
               <a:rPr lang="en-US" smtClean="0"/>
               <a:pPr/>
-              <a:t>5/22/2025</a:t>
+              <a:t>5/25/2025</a:t>
             </a:fld>
             <a:endParaRPr lang="en-US"/>
           </a:p>
@@ -12281,7 +12501,7 @@
           <a:p>
             <a:fld id="{B10618EB-EF56-4375-8DB5-E9051D673290}" type="datetimeFigureOut">
               <a:rPr lang="en-ZA" smtClean="0"/>
-              <a:t>2025/05/22</a:t>
+              <a:t>2025/05/25</a:t>
             </a:fld>
             <a:endParaRPr lang="en-ZA"/>
           </a:p>
@@ -12507,7 +12727,7 @@
             <a:fld id="{B51B2453-8663-4C69-AF73-9FD7B1DEC5D0}" type="datetime1">
               <a:rPr lang="en-US" smtClean="0"/>
               <a:pPr/>
-              <a:t>5/22/2025</a:t>
+              <a:t>5/25/2025</a:t>
             </a:fld>
             <a:endParaRPr lang="en-US" dirty="0"/>
           </a:p>
@@ -15135,7 +15355,7 @@
           <a:p>
             <a:r>
               <a:rPr lang="en-US" dirty="0"/>
-              <a:t>COS 216 Homework Assignment</a:t>
+              <a:t>The Primary Keys</a:t>
             </a:r>
           </a:p>
         </p:txBody>
@@ -15157,7 +15377,7 @@
           <a:p>
             <a:r>
               <a:rPr lang="en-US" dirty="0"/>
-              <a:t>The Primary Keys</a:t>
+              <a:t>COS 221 Assignment 5</a:t>
             </a:r>
           </a:p>
         </p:txBody>
@@ -15192,7 +15412,13 @@
   <p:cSld>
     <p:spTree>
       <p:nvGrpSpPr>
-        <p:cNvPr id="1" name=""/>
+        <p:cNvPr id="1" name="">
+          <a:extLst>
+            <a:ext uri="{FF2B5EF4-FFF2-40B4-BE49-F238E27FC236}">
+              <a16:creationId xmlns:a16="http://schemas.microsoft.com/office/drawing/2014/main" id="{29474AF4-9CC5-6CDD-5638-0957699E1368}"/>
+            </a:ext>
+          </a:extLst>
+        </p:cNvPr>
         <p:cNvGrpSpPr/>
         <p:nvPr/>
       </p:nvGrpSpPr>
@@ -15206,7 +15432,13 @@
       </p:grpSpPr>
       <p:sp>
         <p:nvSpPr>
-          <p:cNvPr id="2" name="Title 1"/>
+          <p:cNvPr id="2" name="Title 1">
+            <a:extLst>
+              <a:ext uri="{FF2B5EF4-FFF2-40B4-BE49-F238E27FC236}">
+                <a16:creationId xmlns:a16="http://schemas.microsoft.com/office/drawing/2014/main" id="{AE8BEDB9-DE91-7A84-3CB2-C30CD21DEB73}"/>
+              </a:ext>
+            </a:extLst>
+          </p:cNvPr>
           <p:cNvSpPr>
             <a:spLocks noGrp="1"/>
           </p:cNvSpPr>
@@ -15228,7 +15460,13 @@
       </p:sp>
       <p:sp>
         <p:nvSpPr>
-          <p:cNvPr id="3" name="Content Placeholder 2"/>
+          <p:cNvPr id="3" name="Content Placeholder 2">
+            <a:extLst>
+              <a:ext uri="{FF2B5EF4-FFF2-40B4-BE49-F238E27FC236}">
+                <a16:creationId xmlns:a16="http://schemas.microsoft.com/office/drawing/2014/main" id="{BC2523CB-48F5-4751-B10E-AC5D5354DDFB}"/>
+              </a:ext>
+            </a:extLst>
+          </p:cNvPr>
           <p:cNvSpPr>
             <a:spLocks noGrp="1"/>
           </p:cNvSpPr>
@@ -15290,6 +15528,92 @@
     </p:spTree>
     <p:extLst>
       <p:ext uri="{BB962C8B-B14F-4D97-AF65-F5344CB8AC3E}">
+        <p14:creationId xmlns:p14="http://schemas.microsoft.com/office/powerpoint/2010/main" val="1889969473"/>
+      </p:ext>
+    </p:extLst>
+  </p:cSld>
+  <p:clrMapOvr>
+    <a:masterClrMapping/>
+  </p:clrMapOvr>
+  <mc:AlternateContent xmlns:mc="http://schemas.openxmlformats.org/markup-compatibility/2006">
+    <mc:Choice xmlns:p14="http://schemas.microsoft.com/office/powerpoint/2010/main" Requires="p14">
+      <p:transition spd="med" p14:dur="700">
+        <p:fade/>
+      </p:transition>
+    </mc:Choice>
+    <mc:Fallback>
+      <p:transition spd="med">
+        <p:fade/>
+      </p:transition>
+    </mc:Fallback>
+  </mc:AlternateContent>
+</p:sld>
+</file>
+
+<file path=ppt/slides/slide3.xml><?xml version="1.0" encoding="utf-8"?>
+<p:sld xmlns:a="http://schemas.openxmlformats.org/drawingml/2006/main" xmlns:r="http://schemas.openxmlformats.org/officeDocument/2006/relationships" xmlns:p="http://schemas.openxmlformats.org/presentationml/2006/main">
+  <p:cSld>
+    <p:spTree>
+      <p:nvGrpSpPr>
+        <p:cNvPr id="1" name=""/>
+        <p:cNvGrpSpPr/>
+        <p:nvPr/>
+      </p:nvGrpSpPr>
+      <p:grpSpPr>
+        <a:xfrm>
+          <a:off x="0" y="0"/>
+          <a:ext cx="0" cy="0"/>
+          <a:chOff x="0" y="0"/>
+          <a:chExt cx="0" cy="0"/>
+        </a:xfrm>
+      </p:grpSpPr>
+      <p:sp>
+        <p:nvSpPr>
+          <p:cNvPr id="2" name="Title 1"/>
+          <p:cNvSpPr>
+            <a:spLocks noGrp="1"/>
+          </p:cNvSpPr>
+          <p:nvPr>
+            <p:ph type="title"/>
+          </p:nvPr>
+        </p:nvSpPr>
+        <p:spPr/>
+        <p:txBody>
+          <a:bodyPr/>
+          <a:lstStyle/>
+          <a:p>
+            <a:r>
+              <a:rPr lang="en-US" dirty="0"/>
+              <a:t>(E)ER Diagram</a:t>
+            </a:r>
+          </a:p>
+        </p:txBody>
+      </p:sp>
+      <p:sp>
+        <p:nvSpPr>
+          <p:cNvPr id="3" name="Content Placeholder 2"/>
+          <p:cNvSpPr>
+            <a:spLocks noGrp="1"/>
+          </p:cNvSpPr>
+          <p:nvPr>
+            <p:ph idx="1"/>
+          </p:nvPr>
+        </p:nvSpPr>
+        <p:spPr/>
+        <p:txBody>
+          <a:bodyPr/>
+          <a:lstStyle/>
+          <a:p>
+            <a:pPr marL="0" indent="0">
+              <a:buNone/>
+            </a:pPr>
+            <a:endParaRPr lang="en-US" dirty="0"/>
+          </a:p>
+        </p:txBody>
+      </p:sp>
+    </p:spTree>
+    <p:extLst>
+      <p:ext uri="{BB962C8B-B14F-4D97-AF65-F5344CB8AC3E}">
         <p14:creationId xmlns:p14="http://schemas.microsoft.com/office/powerpoint/2010/main" val="3984617762"/>
       </p:ext>
     </p:extLst>
@@ -15312,7 +15636,112 @@
 </p:sld>
 </file>
 
-<file path=ppt/slides/slide3.xml><?xml version="1.0" encoding="utf-8"?>
+<file path=ppt/slides/slide4.xml><?xml version="1.0" encoding="utf-8"?>
+<p:sld xmlns:a="http://schemas.openxmlformats.org/drawingml/2006/main" xmlns:r="http://schemas.openxmlformats.org/officeDocument/2006/relationships" xmlns:p="http://schemas.openxmlformats.org/presentationml/2006/main">
+  <p:cSld>
+    <p:spTree>
+      <p:nvGrpSpPr>
+        <p:cNvPr id="1" name="">
+          <a:extLst>
+            <a:ext uri="{FF2B5EF4-FFF2-40B4-BE49-F238E27FC236}">
+              <a16:creationId xmlns:a16="http://schemas.microsoft.com/office/drawing/2014/main" id="{5320C123-BB17-DA2A-31AD-FC70E5591E75}"/>
+            </a:ext>
+          </a:extLst>
+        </p:cNvPr>
+        <p:cNvGrpSpPr/>
+        <p:nvPr/>
+      </p:nvGrpSpPr>
+      <p:grpSpPr>
+        <a:xfrm>
+          <a:off x="0" y="0"/>
+          <a:ext cx="0" cy="0"/>
+          <a:chOff x="0" y="0"/>
+          <a:chExt cx="0" cy="0"/>
+        </a:xfrm>
+      </p:grpSpPr>
+      <p:sp>
+        <p:nvSpPr>
+          <p:cNvPr id="2" name="Title 1">
+            <a:extLst>
+              <a:ext uri="{FF2B5EF4-FFF2-40B4-BE49-F238E27FC236}">
+                <a16:creationId xmlns:a16="http://schemas.microsoft.com/office/drawing/2014/main" id="{90DFB0AA-1CA8-9747-65E8-49C3F74BB953}"/>
+              </a:ext>
+            </a:extLst>
+          </p:cNvPr>
+          <p:cNvSpPr>
+            <a:spLocks noGrp="1"/>
+          </p:cNvSpPr>
+          <p:nvPr>
+            <p:ph type="title"/>
+          </p:nvPr>
+        </p:nvSpPr>
+        <p:spPr/>
+        <p:txBody>
+          <a:bodyPr/>
+          <a:lstStyle/>
+          <a:p>
+            <a:r>
+              <a:rPr lang="en-US"/>
+              <a:t>Relational mapping</a:t>
+            </a:r>
+            <a:endParaRPr lang="en-US" dirty="0"/>
+          </a:p>
+        </p:txBody>
+      </p:sp>
+      <p:sp>
+        <p:nvSpPr>
+          <p:cNvPr id="3" name="Content Placeholder 2">
+            <a:extLst>
+              <a:ext uri="{FF2B5EF4-FFF2-40B4-BE49-F238E27FC236}">
+                <a16:creationId xmlns:a16="http://schemas.microsoft.com/office/drawing/2014/main" id="{880D4A3D-CD84-62B1-635B-A8E725ED7CAD}"/>
+              </a:ext>
+            </a:extLst>
+          </p:cNvPr>
+          <p:cNvSpPr>
+            <a:spLocks noGrp="1"/>
+          </p:cNvSpPr>
+          <p:nvPr>
+            <p:ph idx="1"/>
+          </p:nvPr>
+        </p:nvSpPr>
+        <p:spPr/>
+        <p:txBody>
+          <a:bodyPr/>
+          <a:lstStyle/>
+          <a:p>
+            <a:pPr marL="0" indent="0">
+              <a:buNone/>
+            </a:pPr>
+            <a:endParaRPr lang="en-US" dirty="0"/>
+          </a:p>
+        </p:txBody>
+      </p:sp>
+    </p:spTree>
+    <p:extLst>
+      <p:ext uri="{BB962C8B-B14F-4D97-AF65-F5344CB8AC3E}">
+        <p14:creationId xmlns:p14="http://schemas.microsoft.com/office/powerpoint/2010/main" val="4171181082"/>
+      </p:ext>
+    </p:extLst>
+  </p:cSld>
+  <p:clrMapOvr>
+    <a:masterClrMapping/>
+  </p:clrMapOvr>
+  <mc:AlternateContent xmlns:mc="http://schemas.openxmlformats.org/markup-compatibility/2006">
+    <mc:Choice xmlns:p14="http://schemas.microsoft.com/office/powerpoint/2010/main" Requires="p14">
+      <p:transition spd="med" p14:dur="700">
+        <p:fade/>
+      </p:transition>
+    </mc:Choice>
+    <mc:Fallback>
+      <p:transition spd="med">
+        <p:fade/>
+      </p:transition>
+    </mc:Fallback>
+  </mc:AlternateContent>
+</p:sld>
+</file>
+
+<file path=ppt/slides/slide5.xml><?xml version="1.0" encoding="utf-8"?>
 <p:sld xmlns:a="http://schemas.openxmlformats.org/drawingml/2006/main" xmlns:r="http://schemas.openxmlformats.org/officeDocument/2006/relationships" xmlns:p="http://schemas.openxmlformats.org/presentationml/2006/main">
   <p:cSld>
     <p:spTree>
@@ -15483,13 +15912,13 @@
   <p:clrMapOvr>
     <a:masterClrMapping/>
   </p:clrMapOvr>
-  <mc:AlternateContent xmlns:mc="http://schemas.openxmlformats.org/markup-compatibility/2006">
-    <mc:Choice xmlns:p14="http://schemas.microsoft.com/office/powerpoint/2010/main" Requires="p14">
+  <mc:AlternateContent xmlns:mc="http://schemas.openxmlformats.org/markup-compatibility/2006" xmlns:p14="http://schemas.microsoft.com/office/powerpoint/2010/main">
+    <mc:Choice Requires="p14">
       <p:transition spd="med" p14:dur="700">
         <p:fade/>
       </p:transition>
     </mc:Choice>
-    <mc:Fallback>
+    <mc:Fallback xmlns="">
       <p:transition spd="med">
         <p:fade/>
       </p:transition>
@@ -15498,7 +15927,7 @@
 </p:sld>
 </file>
 
-<file path=ppt/slides/slide4.xml><?xml version="1.0" encoding="utf-8"?>
+<file path=ppt/slides/slide6.xml><?xml version="1.0" encoding="utf-8"?>
 <p:sld xmlns:a="http://schemas.openxmlformats.org/drawingml/2006/main" xmlns:r="http://schemas.openxmlformats.org/officeDocument/2006/relationships" xmlns:p="http://schemas.openxmlformats.org/presentationml/2006/main">
   <p:cSld>
     <p:spTree>
@@ -15587,13 +16016,13 @@
   <p:clrMapOvr>
     <a:masterClrMapping/>
   </p:clrMapOvr>
-  <mc:AlternateContent xmlns:mc="http://schemas.openxmlformats.org/markup-compatibility/2006">
-    <mc:Choice xmlns:p14="http://schemas.microsoft.com/office/powerpoint/2010/main" Requires="p14">
+  <mc:AlternateContent xmlns:mc="http://schemas.openxmlformats.org/markup-compatibility/2006" xmlns:p14="http://schemas.microsoft.com/office/powerpoint/2010/main">
+    <mc:Choice Requires="p14">
       <p:transition spd="med" p14:dur="700">
         <p:fade/>
       </p:transition>
     </mc:Choice>
-    <mc:Fallback>
+    <mc:Fallback xmlns="">
       <p:transition spd="med">
         <p:fade/>
       </p:transition>
@@ -15602,7 +16031,7 @@
 </p:sld>
 </file>
 
-<file path=ppt/slides/slide5.xml><?xml version="1.0" encoding="utf-8"?>
+<file path=ppt/slides/slide7.xml><?xml version="1.0" encoding="utf-8"?>
 <p:sld xmlns:a="http://schemas.openxmlformats.org/drawingml/2006/main" xmlns:r="http://schemas.openxmlformats.org/officeDocument/2006/relationships" xmlns:p="http://schemas.openxmlformats.org/presentationml/2006/main">
   <p:cSld>
     <p:spTree>
@@ -15694,13 +16123,13 @@
   <p:clrMapOvr>
     <a:masterClrMapping/>
   </p:clrMapOvr>
-  <mc:AlternateContent xmlns:mc="http://schemas.openxmlformats.org/markup-compatibility/2006">
-    <mc:Choice xmlns:p14="http://schemas.microsoft.com/office/powerpoint/2010/main" Requires="p14">
+  <mc:AlternateContent xmlns:mc="http://schemas.openxmlformats.org/markup-compatibility/2006" xmlns:p14="http://schemas.microsoft.com/office/powerpoint/2010/main">
+    <mc:Choice Requires="p14">
       <p:transition spd="med" p14:dur="700">
         <p:fade/>
       </p:transition>
     </mc:Choice>
-    <mc:Fallback>
+    <mc:Fallback xmlns="">
       <p:transition spd="med">
         <p:fade/>
       </p:transition>
@@ -15709,7 +16138,7 @@
 </p:sld>
 </file>
 
-<file path=ppt/slides/slide6.xml><?xml version="1.0" encoding="utf-8"?>
+<file path=ppt/slides/slide8.xml><?xml version="1.0" encoding="utf-8"?>
 <p:sld xmlns:a="http://schemas.openxmlformats.org/drawingml/2006/main" xmlns:r="http://schemas.openxmlformats.org/officeDocument/2006/relationships" xmlns:p="http://schemas.openxmlformats.org/presentationml/2006/main">
   <p:cSld>
     <p:spTree>
@@ -15792,13 +16221,13 @@
   <p:clrMapOvr>
     <a:masterClrMapping/>
   </p:clrMapOvr>
-  <mc:AlternateContent xmlns:mc="http://schemas.openxmlformats.org/markup-compatibility/2006">
-    <mc:Choice xmlns:p14="http://schemas.microsoft.com/office/powerpoint/2010/main" Requires="p14">
+  <mc:AlternateContent xmlns:mc="http://schemas.openxmlformats.org/markup-compatibility/2006" xmlns:p14="http://schemas.microsoft.com/office/powerpoint/2010/main">
+    <mc:Choice Requires="p14">
       <p:transition spd="med" p14:dur="700">
         <p:fade/>
       </p:transition>
     </mc:Choice>
-    <mc:Fallback>
+    <mc:Fallback xmlns="">
       <p:transition spd="med">
         <p:fade/>
       </p:transition>

</xml_diff>